<commit_message>
update the picture in slide of Data-Flow
</commit_message>
<xml_diff>
--- a/PPS/PreModule.pptx
+++ b/PPS/PreModule.pptx
@@ -6,6 +6,8 @@
   </p:sldMasterIdLst>
   <p:sldIdLst>
     <p:sldId id="256" r:id="rId2"/>
+    <p:sldId id="257" r:id="rId3"/>
+    <p:sldId id="258" r:id="rId4"/>
   </p:sldIdLst>
   <p:sldSz cx="12192000" cy="6858000"/>
   <p:notesSz cx="6858000" cy="9144000"/>
@@ -104,6 +106,11 @@
       </a:defRPr>
     </a:lvl9pPr>
   </p:defaultTextStyle>
+  <p:extLst>
+    <p:ext uri="{EFAFB233-063F-42B5-8137-9DF3F51BA10A}">
+      <p15:sldGuideLst xmlns:p15="http://schemas.microsoft.com/office/powerpoint/2012/main"/>
+    </p:ext>
+  </p:extLst>
 </p:presentation>
 </file>
 
@@ -254,7 +261,7 @@
           <a:p>
             <a:fld id="{82FB5D42-861B-4AA5-94A2-66F0584F1558}" type="datetimeFigureOut">
               <a:rPr lang="zh-CN" altLang="en-US" smtClean="0"/>
-              <a:t>2024/11/19</a:t>
+              <a:t>2024/12/2</a:t>
             </a:fld>
             <a:endParaRPr lang="zh-CN" altLang="en-US"/>
           </a:p>
@@ -452,7 +459,7 @@
           <a:p>
             <a:fld id="{82FB5D42-861B-4AA5-94A2-66F0584F1558}" type="datetimeFigureOut">
               <a:rPr lang="zh-CN" altLang="en-US" smtClean="0"/>
-              <a:t>2024/11/19</a:t>
+              <a:t>2024/12/2</a:t>
             </a:fld>
             <a:endParaRPr lang="zh-CN" altLang="en-US"/>
           </a:p>
@@ -660,7 +667,7 @@
           <a:p>
             <a:fld id="{82FB5D42-861B-4AA5-94A2-66F0584F1558}" type="datetimeFigureOut">
               <a:rPr lang="zh-CN" altLang="en-US" smtClean="0"/>
-              <a:t>2024/11/19</a:t>
+              <a:t>2024/12/2</a:t>
             </a:fld>
             <a:endParaRPr lang="zh-CN" altLang="en-US"/>
           </a:p>
@@ -858,7 +865,7 @@
           <a:p>
             <a:fld id="{82FB5D42-861B-4AA5-94A2-66F0584F1558}" type="datetimeFigureOut">
               <a:rPr lang="zh-CN" altLang="en-US" smtClean="0"/>
-              <a:t>2024/11/19</a:t>
+              <a:t>2024/12/2</a:t>
             </a:fld>
             <a:endParaRPr lang="zh-CN" altLang="en-US"/>
           </a:p>
@@ -1133,7 +1140,7 @@
           <a:p>
             <a:fld id="{82FB5D42-861B-4AA5-94A2-66F0584F1558}" type="datetimeFigureOut">
               <a:rPr lang="zh-CN" altLang="en-US" smtClean="0"/>
-              <a:t>2024/11/19</a:t>
+              <a:t>2024/12/2</a:t>
             </a:fld>
             <a:endParaRPr lang="zh-CN" altLang="en-US"/>
           </a:p>
@@ -1398,7 +1405,7 @@
           <a:p>
             <a:fld id="{82FB5D42-861B-4AA5-94A2-66F0584F1558}" type="datetimeFigureOut">
               <a:rPr lang="zh-CN" altLang="en-US" smtClean="0"/>
-              <a:t>2024/11/19</a:t>
+              <a:t>2024/12/2</a:t>
             </a:fld>
             <a:endParaRPr lang="zh-CN" altLang="en-US"/>
           </a:p>
@@ -1810,7 +1817,7 @@
           <a:p>
             <a:fld id="{82FB5D42-861B-4AA5-94A2-66F0584F1558}" type="datetimeFigureOut">
               <a:rPr lang="zh-CN" altLang="en-US" smtClean="0"/>
-              <a:t>2024/11/19</a:t>
+              <a:t>2024/12/2</a:t>
             </a:fld>
             <a:endParaRPr lang="zh-CN" altLang="en-US"/>
           </a:p>
@@ -1951,7 +1958,7 @@
           <a:p>
             <a:fld id="{82FB5D42-861B-4AA5-94A2-66F0584F1558}" type="datetimeFigureOut">
               <a:rPr lang="zh-CN" altLang="en-US" smtClean="0"/>
-              <a:t>2024/11/19</a:t>
+              <a:t>2024/12/2</a:t>
             </a:fld>
             <a:endParaRPr lang="zh-CN" altLang="en-US"/>
           </a:p>
@@ -2064,7 +2071,7 @@
           <a:p>
             <a:fld id="{82FB5D42-861B-4AA5-94A2-66F0584F1558}" type="datetimeFigureOut">
               <a:rPr lang="zh-CN" altLang="en-US" smtClean="0"/>
-              <a:t>2024/11/19</a:t>
+              <a:t>2024/12/2</a:t>
             </a:fld>
             <a:endParaRPr lang="zh-CN" altLang="en-US"/>
           </a:p>
@@ -2375,7 +2382,7 @@
           <a:p>
             <a:fld id="{82FB5D42-861B-4AA5-94A2-66F0584F1558}" type="datetimeFigureOut">
               <a:rPr lang="zh-CN" altLang="en-US" smtClean="0"/>
-              <a:t>2024/11/19</a:t>
+              <a:t>2024/12/2</a:t>
             </a:fld>
             <a:endParaRPr lang="zh-CN" altLang="en-US"/>
           </a:p>
@@ -2663,7 +2670,7 @@
           <a:p>
             <a:fld id="{82FB5D42-861B-4AA5-94A2-66F0584F1558}" type="datetimeFigureOut">
               <a:rPr lang="zh-CN" altLang="en-US" smtClean="0"/>
-              <a:t>2024/11/19</a:t>
+              <a:t>2024/12/2</a:t>
             </a:fld>
             <a:endParaRPr lang="zh-CN" altLang="en-US"/>
           </a:p>
@@ -2904,7 +2911,7 @@
           <a:p>
             <a:fld id="{82FB5D42-861B-4AA5-94A2-66F0584F1558}" type="datetimeFigureOut">
               <a:rPr lang="zh-CN" altLang="en-US" smtClean="0"/>
-              <a:t>2024/11/19</a:t>
+              <a:t>2024/12/2</a:t>
             </a:fld>
             <a:endParaRPr lang="zh-CN" altLang="en-US"/>
           </a:p>
@@ -4057,6 +4064,1694 @@
 </p:sld>
 </file>
 
+<file path=ppt/slides/slide2.xml><?xml version="1.0" encoding="utf-8"?>
+<p:sld xmlns:a="http://schemas.openxmlformats.org/drawingml/2006/main" xmlns:r="http://schemas.openxmlformats.org/officeDocument/2006/relationships" xmlns:p="http://schemas.openxmlformats.org/presentationml/2006/main">
+  <p:cSld>
+    <p:spTree>
+      <p:nvGrpSpPr>
+        <p:cNvPr id="1" name="">
+          <a:extLst>
+            <a:ext uri="{FF2B5EF4-FFF2-40B4-BE49-F238E27FC236}">
+              <a16:creationId xmlns:a16="http://schemas.microsoft.com/office/drawing/2014/main" id="{11354712-BA23-4A28-C493-CC64E3ABA938}"/>
+            </a:ext>
+          </a:extLst>
+        </p:cNvPr>
+        <p:cNvGrpSpPr/>
+        <p:nvPr/>
+      </p:nvGrpSpPr>
+      <p:grpSpPr>
+        <a:xfrm>
+          <a:off x="0" y="0"/>
+          <a:ext cx="0" cy="0"/>
+          <a:chOff x="0" y="0"/>
+          <a:chExt cx="0" cy="0"/>
+        </a:xfrm>
+      </p:grpSpPr>
+      <p:sp>
+        <p:nvSpPr>
+          <p:cNvPr id="5" name="矩形 4">
+            <a:extLst>
+              <a:ext uri="{FF2B5EF4-FFF2-40B4-BE49-F238E27FC236}">
+                <a16:creationId xmlns:a16="http://schemas.microsoft.com/office/drawing/2014/main" id="{493A15E7-F494-8F46-6C00-E50BFEE6D8FB}"/>
+              </a:ext>
+            </a:extLst>
+          </p:cNvPr>
+          <p:cNvSpPr/>
+          <p:nvPr/>
+        </p:nvSpPr>
+        <p:spPr>
+          <a:xfrm>
+            <a:off x="2233984" y="1698046"/>
+            <a:ext cx="1300065" cy="373224"/>
+          </a:xfrm>
+          <a:prstGeom prst="rect">
+            <a:avLst/>
+          </a:prstGeom>
+        </p:spPr>
+        <p:style>
+          <a:lnRef idx="2">
+            <a:schemeClr val="accent6"/>
+          </a:lnRef>
+          <a:fillRef idx="1">
+            <a:schemeClr val="lt1"/>
+          </a:fillRef>
+          <a:effectRef idx="0">
+            <a:schemeClr val="accent6"/>
+          </a:effectRef>
+          <a:fontRef idx="minor">
+            <a:schemeClr val="dk1"/>
+          </a:fontRef>
+        </p:style>
+        <p:txBody>
+          <a:bodyPr rtlCol="0" anchor="ctr"/>
+          <a:lstStyle/>
+          <a:p>
+            <a:pPr algn="ctr"/>
+            <a:r>
+              <a:rPr lang="en-US" altLang="zh-CN" dirty="0" err="1">
+                <a:latin typeface="Times New Roman" panose="02020603050405020304" pitchFamily="18" charset="0"/>
+                <a:ea typeface="宋体" panose="02010600030101010101" pitchFamily="2" charset="-122"/>
+              </a:rPr>
+              <a:t>ReadVTK</a:t>
+            </a:r>
+            <a:endParaRPr lang="zh-CN" altLang="en-US" dirty="0">
+              <a:latin typeface="Times New Roman" panose="02020603050405020304" pitchFamily="18" charset="0"/>
+              <a:ea typeface="宋体" panose="02010600030101010101" pitchFamily="2" charset="-122"/>
+            </a:endParaRPr>
+          </a:p>
+        </p:txBody>
+      </p:sp>
+      <p:sp>
+        <p:nvSpPr>
+          <p:cNvPr id="8" name="矩形 7">
+            <a:extLst>
+              <a:ext uri="{FF2B5EF4-FFF2-40B4-BE49-F238E27FC236}">
+                <a16:creationId xmlns:a16="http://schemas.microsoft.com/office/drawing/2014/main" id="{AA95841A-6FB1-05F4-53E0-0B8DDCBA46DA}"/>
+              </a:ext>
+            </a:extLst>
+          </p:cNvPr>
+          <p:cNvSpPr/>
+          <p:nvPr/>
+        </p:nvSpPr>
+        <p:spPr>
+          <a:xfrm>
+            <a:off x="3657491" y="3429000"/>
+            <a:ext cx="1300065" cy="373224"/>
+          </a:xfrm>
+          <a:prstGeom prst="rect">
+            <a:avLst/>
+          </a:prstGeom>
+        </p:spPr>
+        <p:style>
+          <a:lnRef idx="2">
+            <a:schemeClr val="accent6"/>
+          </a:lnRef>
+          <a:fillRef idx="1">
+            <a:schemeClr val="lt1"/>
+          </a:fillRef>
+          <a:effectRef idx="0">
+            <a:schemeClr val="accent6"/>
+          </a:effectRef>
+          <a:fontRef idx="minor">
+            <a:schemeClr val="dk1"/>
+          </a:fontRef>
+        </p:style>
+        <p:txBody>
+          <a:bodyPr rtlCol="0" anchor="ctr"/>
+          <a:lstStyle/>
+          <a:p>
+            <a:pPr algn="ctr"/>
+            <a:r>
+              <a:rPr lang="en-US" altLang="zh-CN" dirty="0" err="1">
+                <a:latin typeface="Times New Roman" panose="02020603050405020304" pitchFamily="18" charset="0"/>
+                <a:ea typeface="宋体" panose="02010600030101010101" pitchFamily="2" charset="-122"/>
+              </a:rPr>
+              <a:t>WriteHDF</a:t>
+            </a:r>
+            <a:endParaRPr lang="zh-CN" altLang="en-US" dirty="0">
+              <a:latin typeface="Times New Roman" panose="02020603050405020304" pitchFamily="18" charset="0"/>
+              <a:ea typeface="宋体" panose="02010600030101010101" pitchFamily="2" charset="-122"/>
+            </a:endParaRPr>
+          </a:p>
+        </p:txBody>
+      </p:sp>
+      <p:sp>
+        <p:nvSpPr>
+          <p:cNvPr id="29" name="矩形 28">
+            <a:extLst>
+              <a:ext uri="{FF2B5EF4-FFF2-40B4-BE49-F238E27FC236}">
+                <a16:creationId xmlns:a16="http://schemas.microsoft.com/office/drawing/2014/main" id="{AA9D0995-54CF-85B9-199E-2E142F15B066}"/>
+              </a:ext>
+            </a:extLst>
+          </p:cNvPr>
+          <p:cNvSpPr/>
+          <p:nvPr/>
+        </p:nvSpPr>
+        <p:spPr>
+          <a:xfrm>
+            <a:off x="8599976" y="2564368"/>
+            <a:ext cx="1300065" cy="373224"/>
+          </a:xfrm>
+          <a:prstGeom prst="rect">
+            <a:avLst/>
+          </a:prstGeom>
+        </p:spPr>
+        <p:style>
+          <a:lnRef idx="2">
+            <a:schemeClr val="accent6"/>
+          </a:lnRef>
+          <a:fillRef idx="1">
+            <a:schemeClr val="lt1"/>
+          </a:fillRef>
+          <a:effectRef idx="0">
+            <a:schemeClr val="accent6"/>
+          </a:effectRef>
+          <a:fontRef idx="minor">
+            <a:schemeClr val="dk1"/>
+          </a:fontRef>
+        </p:style>
+        <p:txBody>
+          <a:bodyPr rtlCol="0" anchor="ctr"/>
+          <a:lstStyle/>
+          <a:p>
+            <a:pPr algn="ctr"/>
+            <a:r>
+              <a:rPr lang="en-US" altLang="zh-CN" dirty="0" err="1">
+                <a:latin typeface="Times New Roman" panose="02020603050405020304" pitchFamily="18" charset="0"/>
+                <a:ea typeface="宋体" panose="02010600030101010101" pitchFamily="2" charset="-122"/>
+              </a:rPr>
+              <a:t>WriteVTK</a:t>
+            </a:r>
+            <a:endParaRPr lang="zh-CN" altLang="en-US" dirty="0">
+              <a:latin typeface="Times New Roman" panose="02020603050405020304" pitchFamily="18" charset="0"/>
+              <a:ea typeface="宋体" panose="02010600030101010101" pitchFamily="2" charset="-122"/>
+            </a:endParaRPr>
+          </a:p>
+        </p:txBody>
+      </p:sp>
+      <p:cxnSp>
+        <p:nvCxnSpPr>
+          <p:cNvPr id="22" name="连接符: 肘形 21">
+            <a:extLst>
+              <a:ext uri="{FF2B5EF4-FFF2-40B4-BE49-F238E27FC236}">
+                <a16:creationId xmlns:a16="http://schemas.microsoft.com/office/drawing/2014/main" id="{D6BE3A9B-4597-2600-A419-B3B27D8E73AE}"/>
+              </a:ext>
+            </a:extLst>
+          </p:cNvPr>
+          <p:cNvCxnSpPr>
+            <a:cxnSpLocks/>
+            <a:stCxn id="39" idx="0"/>
+            <a:endCxn id="5" idx="1"/>
+          </p:cNvCxnSpPr>
+          <p:nvPr/>
+        </p:nvCxnSpPr>
+        <p:spPr>
+          <a:xfrm rot="5400000" flipH="1" flipV="1">
+            <a:off x="1955046" y="2001460"/>
+            <a:ext cx="395739" cy="162137"/>
+          </a:xfrm>
+          <a:prstGeom prst="bentConnector2">
+            <a:avLst/>
+          </a:prstGeom>
+          <a:ln>
+            <a:tailEnd type="triangle"/>
+          </a:ln>
+        </p:spPr>
+        <p:style>
+          <a:lnRef idx="1">
+            <a:schemeClr val="accent1"/>
+          </a:lnRef>
+          <a:fillRef idx="0">
+            <a:schemeClr val="accent1"/>
+          </a:fillRef>
+          <a:effectRef idx="0">
+            <a:schemeClr val="accent1"/>
+          </a:effectRef>
+          <a:fontRef idx="minor">
+            <a:schemeClr val="tx1"/>
+          </a:fontRef>
+        </p:style>
+      </p:cxnSp>
+      <p:cxnSp>
+        <p:nvCxnSpPr>
+          <p:cNvPr id="28" name="连接符: 肘形 27">
+            <a:extLst>
+              <a:ext uri="{FF2B5EF4-FFF2-40B4-BE49-F238E27FC236}">
+                <a16:creationId xmlns:a16="http://schemas.microsoft.com/office/drawing/2014/main" id="{F7108BE8-56A4-EB2D-B4EA-4FEF2395965F}"/>
+              </a:ext>
+            </a:extLst>
+          </p:cNvPr>
+          <p:cNvCxnSpPr>
+            <a:cxnSpLocks/>
+            <a:stCxn id="5" idx="3"/>
+            <a:endCxn id="42" idx="0"/>
+          </p:cNvCxnSpPr>
+          <p:nvPr/>
+        </p:nvCxnSpPr>
+        <p:spPr>
+          <a:xfrm>
+            <a:off x="3534049" y="1884658"/>
+            <a:ext cx="147414" cy="395739"/>
+          </a:xfrm>
+          <a:prstGeom prst="bentConnector2">
+            <a:avLst/>
+          </a:prstGeom>
+          <a:ln>
+            <a:tailEnd type="triangle"/>
+          </a:ln>
+        </p:spPr>
+        <p:style>
+          <a:lnRef idx="1">
+            <a:schemeClr val="accent1"/>
+          </a:lnRef>
+          <a:fillRef idx="0">
+            <a:schemeClr val="accent1"/>
+          </a:fillRef>
+          <a:effectRef idx="0">
+            <a:schemeClr val="accent1"/>
+          </a:effectRef>
+          <a:fontRef idx="minor">
+            <a:schemeClr val="tx1"/>
+          </a:fontRef>
+        </p:style>
+      </p:cxnSp>
+      <p:sp>
+        <p:nvSpPr>
+          <p:cNvPr id="39" name="流程图: 多文档 38">
+            <a:extLst>
+              <a:ext uri="{FF2B5EF4-FFF2-40B4-BE49-F238E27FC236}">
+                <a16:creationId xmlns:a16="http://schemas.microsoft.com/office/drawing/2014/main" id="{51F5D647-A39E-D124-7EE9-594C751BEDA8}"/>
+              </a:ext>
+            </a:extLst>
+          </p:cNvPr>
+          <p:cNvSpPr/>
+          <p:nvPr/>
+        </p:nvSpPr>
+        <p:spPr>
+          <a:xfrm>
+            <a:off x="1332375" y="2280397"/>
+            <a:ext cx="1300065" cy="941169"/>
+          </a:xfrm>
+          <a:prstGeom prst="flowChartMultidocument">
+            <a:avLst/>
+          </a:prstGeom>
+        </p:spPr>
+        <p:style>
+          <a:lnRef idx="2">
+            <a:schemeClr val="accent1">
+              <a:shade val="15000"/>
+            </a:schemeClr>
+          </a:lnRef>
+          <a:fillRef idx="1">
+            <a:schemeClr val="accent1"/>
+          </a:fillRef>
+          <a:effectRef idx="0">
+            <a:schemeClr val="accent1"/>
+          </a:effectRef>
+          <a:fontRef idx="minor">
+            <a:schemeClr val="lt1"/>
+          </a:fontRef>
+        </p:style>
+        <p:txBody>
+          <a:bodyPr rtlCol="0" anchor="ctr"/>
+          <a:lstStyle/>
+          <a:p>
+            <a:pPr algn="ctr"/>
+            <a:r>
+              <a:rPr lang="en-US" altLang="zh-CN" dirty="0" err="1">
+                <a:latin typeface="Times New Roman" panose="02020603050405020304" pitchFamily="18" charset="0"/>
+                <a:cs typeface="Times New Roman" panose="02020603050405020304" pitchFamily="18" charset="0"/>
+              </a:rPr>
+              <a:t>VTKData</a:t>
+            </a:r>
+            <a:endParaRPr lang="zh-CN" altLang="en-US" dirty="0">
+              <a:latin typeface="Times New Roman" panose="02020603050405020304" pitchFamily="18" charset="0"/>
+              <a:cs typeface="Times New Roman" panose="02020603050405020304" pitchFamily="18" charset="0"/>
+            </a:endParaRPr>
+          </a:p>
+        </p:txBody>
+      </p:sp>
+      <p:sp>
+        <p:nvSpPr>
+          <p:cNvPr id="42" name="流程图: 多文档 41">
+            <a:extLst>
+              <a:ext uri="{FF2B5EF4-FFF2-40B4-BE49-F238E27FC236}">
+                <a16:creationId xmlns:a16="http://schemas.microsoft.com/office/drawing/2014/main" id="{7E1BA8C6-FF78-F1C4-D334-7520AB499180}"/>
+              </a:ext>
+            </a:extLst>
+          </p:cNvPr>
+          <p:cNvSpPr/>
+          <p:nvPr/>
+        </p:nvSpPr>
+        <p:spPr>
+          <a:xfrm>
+            <a:off x="2941991" y="2280397"/>
+            <a:ext cx="1300065" cy="941169"/>
+          </a:xfrm>
+          <a:prstGeom prst="flowChartMultidocument">
+            <a:avLst/>
+          </a:prstGeom>
+        </p:spPr>
+        <p:style>
+          <a:lnRef idx="2">
+            <a:schemeClr val="accent1">
+              <a:shade val="15000"/>
+            </a:schemeClr>
+          </a:lnRef>
+          <a:fillRef idx="1">
+            <a:schemeClr val="accent1"/>
+          </a:fillRef>
+          <a:effectRef idx="0">
+            <a:schemeClr val="accent1"/>
+          </a:effectRef>
+          <a:fontRef idx="minor">
+            <a:schemeClr val="lt1"/>
+          </a:fontRef>
+        </p:style>
+        <p:txBody>
+          <a:bodyPr rtlCol="0" anchor="ctr"/>
+          <a:lstStyle/>
+          <a:p>
+            <a:pPr algn="ctr"/>
+            <a:r>
+              <a:rPr lang="en-US" altLang="zh-CN" dirty="0" err="1">
+                <a:latin typeface="Times New Roman" panose="02020603050405020304" pitchFamily="18" charset="0"/>
+                <a:cs typeface="Times New Roman" panose="02020603050405020304" pitchFamily="18" charset="0"/>
+              </a:rPr>
+              <a:t>CSVData</a:t>
+            </a:r>
+            <a:endParaRPr lang="zh-CN" altLang="en-US" dirty="0">
+              <a:latin typeface="Times New Roman" panose="02020603050405020304" pitchFamily="18" charset="0"/>
+              <a:cs typeface="Times New Roman" panose="02020603050405020304" pitchFamily="18" charset="0"/>
+            </a:endParaRPr>
+          </a:p>
+        </p:txBody>
+      </p:sp>
+      <p:sp>
+        <p:nvSpPr>
+          <p:cNvPr id="47" name="流程图: 多文档 46">
+            <a:extLst>
+              <a:ext uri="{FF2B5EF4-FFF2-40B4-BE49-F238E27FC236}">
+                <a16:creationId xmlns:a16="http://schemas.microsoft.com/office/drawing/2014/main" id="{2EFA3FBA-89EF-6D09-A779-3C094B6F6F91}"/>
+              </a:ext>
+            </a:extLst>
+          </p:cNvPr>
+          <p:cNvSpPr/>
+          <p:nvPr/>
+        </p:nvSpPr>
+        <p:spPr>
+          <a:xfrm>
+            <a:off x="4583072" y="2280396"/>
+            <a:ext cx="1544393" cy="941169"/>
+          </a:xfrm>
+          <a:prstGeom prst="flowChartMultidocument">
+            <a:avLst/>
+          </a:prstGeom>
+        </p:spPr>
+        <p:style>
+          <a:lnRef idx="2">
+            <a:schemeClr val="accent1">
+              <a:shade val="15000"/>
+            </a:schemeClr>
+          </a:lnRef>
+          <a:fillRef idx="1">
+            <a:schemeClr val="accent1"/>
+          </a:fillRef>
+          <a:effectRef idx="0">
+            <a:schemeClr val="accent1"/>
+          </a:effectRef>
+          <a:fontRef idx="minor">
+            <a:schemeClr val="lt1"/>
+          </a:fontRef>
+        </p:style>
+        <p:txBody>
+          <a:bodyPr rtlCol="0" anchor="ctr"/>
+          <a:lstStyle/>
+          <a:p>
+            <a:pPr algn="ctr"/>
+            <a:r>
+              <a:rPr lang="en-US" altLang="zh-CN" dirty="0">
+                <a:latin typeface="Times New Roman" panose="02020603050405020304" pitchFamily="18" charset="0"/>
+                <a:cs typeface="Times New Roman" panose="02020603050405020304" pitchFamily="18" charset="0"/>
+              </a:rPr>
+              <a:t>HDF5</a:t>
+            </a:r>
+          </a:p>
+          <a:p>
+            <a:pPr algn="ctr"/>
+            <a:r>
+              <a:rPr lang="en-US" altLang="zh-CN" dirty="0">
+                <a:latin typeface="Times New Roman" panose="02020603050405020304" pitchFamily="18" charset="0"/>
+                <a:cs typeface="Times New Roman" panose="02020603050405020304" pitchFamily="18" charset="0"/>
+              </a:rPr>
+              <a:t>Matrix Data</a:t>
+            </a:r>
+            <a:endParaRPr lang="zh-CN" altLang="en-US" dirty="0">
+              <a:latin typeface="Times New Roman" panose="02020603050405020304" pitchFamily="18" charset="0"/>
+              <a:cs typeface="Times New Roman" panose="02020603050405020304" pitchFamily="18" charset="0"/>
+            </a:endParaRPr>
+          </a:p>
+        </p:txBody>
+      </p:sp>
+      <p:sp>
+        <p:nvSpPr>
+          <p:cNvPr id="48" name="动作按钮: 获取信息 47">
+            <a:hlinkClick r:id="" action="ppaction://noaction" highlightClick="1"/>
+            <a:extLst>
+              <a:ext uri="{FF2B5EF4-FFF2-40B4-BE49-F238E27FC236}">
+                <a16:creationId xmlns:a16="http://schemas.microsoft.com/office/drawing/2014/main" id="{5A3D05B4-6D99-BB30-E6BC-4EFD35701DB9}"/>
+              </a:ext>
+            </a:extLst>
+          </p:cNvPr>
+          <p:cNvSpPr/>
+          <p:nvPr/>
+        </p:nvSpPr>
+        <p:spPr>
+          <a:xfrm>
+            <a:off x="2253034" y="1827507"/>
+            <a:ext cx="162137" cy="186612"/>
+          </a:xfrm>
+          <a:prstGeom prst="actionButtonInformation">
+            <a:avLst/>
+          </a:prstGeom>
+          <a:ln>
+            <a:noFill/>
+          </a:ln>
+        </p:spPr>
+        <p:style>
+          <a:lnRef idx="2">
+            <a:schemeClr val="dk1"/>
+          </a:lnRef>
+          <a:fillRef idx="1">
+            <a:schemeClr val="lt1"/>
+          </a:fillRef>
+          <a:effectRef idx="0">
+            <a:schemeClr val="dk1"/>
+          </a:effectRef>
+          <a:fontRef idx="minor">
+            <a:schemeClr val="dk1"/>
+          </a:fontRef>
+        </p:style>
+        <p:txBody>
+          <a:bodyPr rtlCol="0" anchor="ctr"/>
+          <a:lstStyle/>
+          <a:p>
+            <a:pPr algn="ctr"/>
+            <a:endParaRPr lang="zh-CN" altLang="en-US"/>
+          </a:p>
+        </p:txBody>
+      </p:sp>
+      <p:sp>
+        <p:nvSpPr>
+          <p:cNvPr id="49" name="矩形: 圆角 48">
+            <a:extLst>
+              <a:ext uri="{FF2B5EF4-FFF2-40B4-BE49-F238E27FC236}">
+                <a16:creationId xmlns:a16="http://schemas.microsoft.com/office/drawing/2014/main" id="{6F7D3C85-854B-8575-70DB-3C1B068AFEB3}"/>
+              </a:ext>
+            </a:extLst>
+          </p:cNvPr>
+          <p:cNvSpPr/>
+          <p:nvPr/>
+        </p:nvSpPr>
+        <p:spPr>
+          <a:xfrm>
+            <a:off x="6468480" y="1542615"/>
+            <a:ext cx="1333085" cy="756396"/>
+          </a:xfrm>
+          <a:prstGeom prst="roundRect">
+            <a:avLst>
+              <a:gd name="adj" fmla="val 34297"/>
+            </a:avLst>
+          </a:prstGeom>
+        </p:spPr>
+        <p:style>
+          <a:lnRef idx="2">
+            <a:schemeClr val="dk1"/>
+          </a:lnRef>
+          <a:fillRef idx="1">
+            <a:schemeClr val="lt1"/>
+          </a:fillRef>
+          <a:effectRef idx="0">
+            <a:schemeClr val="dk1"/>
+          </a:effectRef>
+          <a:fontRef idx="minor">
+            <a:schemeClr val="dk1"/>
+          </a:fontRef>
+        </p:style>
+        <p:txBody>
+          <a:bodyPr rtlCol="0" anchor="ctr"/>
+          <a:lstStyle/>
+          <a:p>
+            <a:pPr algn="ctr"/>
+            <a:r>
+              <a:rPr lang="en-US" altLang="zh-CN" dirty="0">
+                <a:latin typeface="Times New Roman" panose="02020603050405020304" pitchFamily="18" charset="0"/>
+                <a:ea typeface="宋体" panose="02010600030101010101" pitchFamily="2" charset="-122"/>
+              </a:rPr>
+              <a:t>FNN</a:t>
+            </a:r>
+            <a:endParaRPr lang="zh-CN" altLang="en-US" dirty="0">
+              <a:latin typeface="Times New Roman" panose="02020603050405020304" pitchFamily="18" charset="0"/>
+              <a:ea typeface="宋体" panose="02010600030101010101" pitchFamily="2" charset="-122"/>
+            </a:endParaRPr>
+          </a:p>
+        </p:txBody>
+      </p:sp>
+      <p:sp>
+        <p:nvSpPr>
+          <p:cNvPr id="50" name="矩形: 圆角 49">
+            <a:extLst>
+              <a:ext uri="{FF2B5EF4-FFF2-40B4-BE49-F238E27FC236}">
+                <a16:creationId xmlns:a16="http://schemas.microsoft.com/office/drawing/2014/main" id="{47F735E9-C8CA-042B-11F9-E345D4525FA5}"/>
+              </a:ext>
+            </a:extLst>
+          </p:cNvPr>
+          <p:cNvSpPr/>
+          <p:nvPr/>
+        </p:nvSpPr>
+        <p:spPr>
+          <a:xfrm>
+            <a:off x="6468479" y="3237414"/>
+            <a:ext cx="1333085" cy="756396"/>
+          </a:xfrm>
+          <a:prstGeom prst="roundRect">
+            <a:avLst>
+              <a:gd name="adj" fmla="val 34297"/>
+            </a:avLst>
+          </a:prstGeom>
+        </p:spPr>
+        <p:style>
+          <a:lnRef idx="2">
+            <a:schemeClr val="dk1"/>
+          </a:lnRef>
+          <a:fillRef idx="1">
+            <a:schemeClr val="lt1"/>
+          </a:fillRef>
+          <a:effectRef idx="0">
+            <a:schemeClr val="dk1"/>
+          </a:effectRef>
+          <a:fontRef idx="minor">
+            <a:schemeClr val="dk1"/>
+          </a:fontRef>
+        </p:style>
+        <p:txBody>
+          <a:bodyPr rtlCol="0" anchor="ctr"/>
+          <a:lstStyle/>
+          <a:p>
+            <a:pPr algn="ctr"/>
+            <a:r>
+              <a:rPr lang="en-US" altLang="zh-CN" dirty="0">
+                <a:latin typeface="Times New Roman" panose="02020603050405020304" pitchFamily="18" charset="0"/>
+                <a:ea typeface="宋体" panose="02010600030101010101" pitchFamily="2" charset="-122"/>
+              </a:rPr>
+              <a:t>GAN</a:t>
+            </a:r>
+            <a:endParaRPr lang="zh-CN" altLang="en-US" dirty="0">
+              <a:latin typeface="Times New Roman" panose="02020603050405020304" pitchFamily="18" charset="0"/>
+              <a:ea typeface="宋体" panose="02010600030101010101" pitchFamily="2" charset="-122"/>
+            </a:endParaRPr>
+          </a:p>
+        </p:txBody>
+      </p:sp>
+      <p:cxnSp>
+        <p:nvCxnSpPr>
+          <p:cNvPr id="52" name="连接符: 肘形 51">
+            <a:extLst>
+              <a:ext uri="{FF2B5EF4-FFF2-40B4-BE49-F238E27FC236}">
+                <a16:creationId xmlns:a16="http://schemas.microsoft.com/office/drawing/2014/main" id="{FCBBF6D7-C915-9EA4-F2FD-1CF103CF65AC}"/>
+              </a:ext>
+            </a:extLst>
+          </p:cNvPr>
+          <p:cNvCxnSpPr>
+            <a:stCxn id="42" idx="2"/>
+            <a:endCxn id="8" idx="1"/>
+          </p:cNvCxnSpPr>
+          <p:nvPr/>
+        </p:nvCxnSpPr>
+        <p:spPr>
+          <a:xfrm rot="16200000" flipH="1">
+            <a:off x="3364712" y="3322833"/>
+            <a:ext cx="429688" cy="155870"/>
+          </a:xfrm>
+          <a:prstGeom prst="bentConnector2">
+            <a:avLst/>
+          </a:prstGeom>
+          <a:ln>
+            <a:tailEnd type="triangle"/>
+          </a:ln>
+        </p:spPr>
+        <p:style>
+          <a:lnRef idx="1">
+            <a:schemeClr val="accent1"/>
+          </a:lnRef>
+          <a:fillRef idx="0">
+            <a:schemeClr val="accent1"/>
+          </a:fillRef>
+          <a:effectRef idx="0">
+            <a:schemeClr val="accent1"/>
+          </a:effectRef>
+          <a:fontRef idx="minor">
+            <a:schemeClr val="tx1"/>
+          </a:fontRef>
+        </p:style>
+      </p:cxnSp>
+      <p:cxnSp>
+        <p:nvCxnSpPr>
+          <p:cNvPr id="55" name="连接符: 肘形 54">
+            <a:extLst>
+              <a:ext uri="{FF2B5EF4-FFF2-40B4-BE49-F238E27FC236}">
+                <a16:creationId xmlns:a16="http://schemas.microsoft.com/office/drawing/2014/main" id="{36DB343A-CAA4-DA6F-A9B8-35EBAEBC241B}"/>
+              </a:ext>
+            </a:extLst>
+          </p:cNvPr>
+          <p:cNvCxnSpPr>
+            <a:stCxn id="47" idx="0"/>
+            <a:endCxn id="49" idx="1"/>
+          </p:cNvCxnSpPr>
+          <p:nvPr/>
+        </p:nvCxnSpPr>
+        <p:spPr>
+          <a:xfrm rot="5400000" flipH="1" flipV="1">
+            <a:off x="5785207" y="1597124"/>
+            <a:ext cx="359583" cy="1006963"/>
+          </a:xfrm>
+          <a:prstGeom prst="bentConnector2">
+            <a:avLst/>
+          </a:prstGeom>
+          <a:ln>
+            <a:tailEnd type="triangle"/>
+          </a:ln>
+        </p:spPr>
+        <p:style>
+          <a:lnRef idx="1">
+            <a:schemeClr val="accent1"/>
+          </a:lnRef>
+          <a:fillRef idx="0">
+            <a:schemeClr val="accent1"/>
+          </a:fillRef>
+          <a:effectRef idx="0">
+            <a:schemeClr val="accent1"/>
+          </a:effectRef>
+          <a:fontRef idx="minor">
+            <a:schemeClr val="tx1"/>
+          </a:fontRef>
+        </p:style>
+      </p:cxnSp>
+      <p:cxnSp>
+        <p:nvCxnSpPr>
+          <p:cNvPr id="57" name="连接符: 肘形 56">
+            <a:extLst>
+              <a:ext uri="{FF2B5EF4-FFF2-40B4-BE49-F238E27FC236}">
+                <a16:creationId xmlns:a16="http://schemas.microsoft.com/office/drawing/2014/main" id="{5F9CDD89-4E6C-E07E-E8BC-833272600C00}"/>
+              </a:ext>
+            </a:extLst>
+          </p:cNvPr>
+          <p:cNvCxnSpPr>
+            <a:stCxn id="47" idx="2"/>
+            <a:endCxn id="50" idx="1"/>
+          </p:cNvCxnSpPr>
+          <p:nvPr/>
+        </p:nvCxnSpPr>
+        <p:spPr>
+          <a:xfrm rot="16200000" flipH="1">
+            <a:off x="5643333" y="2790465"/>
+            <a:ext cx="429689" cy="1220603"/>
+          </a:xfrm>
+          <a:prstGeom prst="bentConnector2">
+            <a:avLst/>
+          </a:prstGeom>
+          <a:ln>
+            <a:tailEnd type="triangle"/>
+          </a:ln>
+        </p:spPr>
+        <p:style>
+          <a:lnRef idx="1">
+            <a:schemeClr val="accent1"/>
+          </a:lnRef>
+          <a:fillRef idx="0">
+            <a:schemeClr val="accent1"/>
+          </a:fillRef>
+          <a:effectRef idx="0">
+            <a:schemeClr val="accent1"/>
+          </a:effectRef>
+          <a:fontRef idx="minor">
+            <a:schemeClr val="tx1"/>
+          </a:fontRef>
+        </p:style>
+      </p:cxnSp>
+      <p:cxnSp>
+        <p:nvCxnSpPr>
+          <p:cNvPr id="59" name="连接符: 肘形 58">
+            <a:extLst>
+              <a:ext uri="{FF2B5EF4-FFF2-40B4-BE49-F238E27FC236}">
+                <a16:creationId xmlns:a16="http://schemas.microsoft.com/office/drawing/2014/main" id="{E776BFBB-2151-6F60-4F98-AC83BDB96DC5}"/>
+              </a:ext>
+            </a:extLst>
+          </p:cNvPr>
+          <p:cNvCxnSpPr>
+            <a:stCxn id="50" idx="0"/>
+            <a:endCxn id="47" idx="3"/>
+          </p:cNvCxnSpPr>
+          <p:nvPr/>
+        </p:nvCxnSpPr>
+        <p:spPr>
+          <a:xfrm rot="16200000" flipV="1">
+            <a:off x="6388028" y="2490419"/>
+            <a:ext cx="486433" cy="1007557"/>
+          </a:xfrm>
+          <a:prstGeom prst="bentConnector2">
+            <a:avLst/>
+          </a:prstGeom>
+          <a:ln>
+            <a:tailEnd type="triangle"/>
+          </a:ln>
+        </p:spPr>
+        <p:style>
+          <a:lnRef idx="1">
+            <a:schemeClr val="accent1"/>
+          </a:lnRef>
+          <a:fillRef idx="0">
+            <a:schemeClr val="accent1"/>
+          </a:fillRef>
+          <a:effectRef idx="0">
+            <a:schemeClr val="accent1"/>
+          </a:effectRef>
+          <a:fontRef idx="minor">
+            <a:schemeClr val="tx1"/>
+          </a:fontRef>
+        </p:style>
+      </p:cxnSp>
+      <p:cxnSp>
+        <p:nvCxnSpPr>
+          <p:cNvPr id="61" name="连接符: 肘形 60">
+            <a:extLst>
+              <a:ext uri="{FF2B5EF4-FFF2-40B4-BE49-F238E27FC236}">
+                <a16:creationId xmlns:a16="http://schemas.microsoft.com/office/drawing/2014/main" id="{9B40AC17-740D-50E1-A8A9-9A424D4FFF0F}"/>
+              </a:ext>
+            </a:extLst>
+          </p:cNvPr>
+          <p:cNvCxnSpPr>
+            <a:stCxn id="49" idx="2"/>
+            <a:endCxn id="47" idx="3"/>
+          </p:cNvCxnSpPr>
+          <p:nvPr/>
+        </p:nvCxnSpPr>
+        <p:spPr>
+          <a:xfrm rot="5400000">
+            <a:off x="6405259" y="2021217"/>
+            <a:ext cx="451970" cy="1007558"/>
+          </a:xfrm>
+          <a:prstGeom prst="bentConnector2">
+            <a:avLst/>
+          </a:prstGeom>
+          <a:ln>
+            <a:tailEnd type="triangle"/>
+          </a:ln>
+        </p:spPr>
+        <p:style>
+          <a:lnRef idx="1">
+            <a:schemeClr val="accent1"/>
+          </a:lnRef>
+          <a:fillRef idx="0">
+            <a:schemeClr val="accent1"/>
+          </a:fillRef>
+          <a:effectRef idx="0">
+            <a:schemeClr val="accent1"/>
+          </a:effectRef>
+          <a:fontRef idx="minor">
+            <a:schemeClr val="tx1"/>
+          </a:fontRef>
+        </p:style>
+      </p:cxnSp>
+    </p:spTree>
+    <p:extLst>
+      <p:ext uri="{BB962C8B-B14F-4D97-AF65-F5344CB8AC3E}">
+        <p14:creationId xmlns:p14="http://schemas.microsoft.com/office/powerpoint/2010/main" val="383849297"/>
+      </p:ext>
+    </p:extLst>
+  </p:cSld>
+  <p:clrMapOvr>
+    <a:masterClrMapping/>
+  </p:clrMapOvr>
+</p:sld>
+</file>
+
+<file path=ppt/slides/slide3.xml><?xml version="1.0" encoding="utf-8"?>
+<p:sld xmlns:a="http://schemas.openxmlformats.org/drawingml/2006/main" xmlns:r="http://schemas.openxmlformats.org/officeDocument/2006/relationships" xmlns:p="http://schemas.openxmlformats.org/presentationml/2006/main">
+  <p:cSld>
+    <p:spTree>
+      <p:nvGrpSpPr>
+        <p:cNvPr id="1" name="">
+          <a:extLst>
+            <a:ext uri="{FF2B5EF4-FFF2-40B4-BE49-F238E27FC236}">
+              <a16:creationId xmlns:a16="http://schemas.microsoft.com/office/drawing/2014/main" id="{C69B2A8B-30DC-8D30-5FC4-9E12C3B5FE9F}"/>
+            </a:ext>
+          </a:extLst>
+        </p:cNvPr>
+        <p:cNvGrpSpPr/>
+        <p:nvPr/>
+      </p:nvGrpSpPr>
+      <p:grpSpPr>
+        <a:xfrm>
+          <a:off x="0" y="0"/>
+          <a:ext cx="0" cy="0"/>
+          <a:chOff x="0" y="0"/>
+          <a:chExt cx="0" cy="0"/>
+        </a:xfrm>
+      </p:grpSpPr>
+      <p:sp>
+        <p:nvSpPr>
+          <p:cNvPr id="5" name="矩形 4">
+            <a:extLst>
+              <a:ext uri="{FF2B5EF4-FFF2-40B4-BE49-F238E27FC236}">
+                <a16:creationId xmlns:a16="http://schemas.microsoft.com/office/drawing/2014/main" id="{7D0CC751-97F5-413E-EE57-9A265DB81FB6}"/>
+              </a:ext>
+            </a:extLst>
+          </p:cNvPr>
+          <p:cNvSpPr/>
+          <p:nvPr/>
+        </p:nvSpPr>
+        <p:spPr>
+          <a:xfrm>
+            <a:off x="2093818" y="3404530"/>
+            <a:ext cx="1300065" cy="373224"/>
+          </a:xfrm>
+          <a:prstGeom prst="rect">
+            <a:avLst/>
+          </a:prstGeom>
+        </p:spPr>
+        <p:style>
+          <a:lnRef idx="2">
+            <a:schemeClr val="accent6"/>
+          </a:lnRef>
+          <a:fillRef idx="1">
+            <a:schemeClr val="lt1"/>
+          </a:fillRef>
+          <a:effectRef idx="0">
+            <a:schemeClr val="accent6"/>
+          </a:effectRef>
+          <a:fontRef idx="minor">
+            <a:schemeClr val="dk1"/>
+          </a:fontRef>
+        </p:style>
+        <p:txBody>
+          <a:bodyPr rtlCol="0" anchor="ctr"/>
+          <a:lstStyle/>
+          <a:p>
+            <a:pPr algn="ctr"/>
+            <a:r>
+              <a:rPr lang="en-US" altLang="zh-CN" dirty="0" err="1">
+                <a:latin typeface="Times New Roman" panose="02020603050405020304" pitchFamily="18" charset="0"/>
+                <a:ea typeface="宋体" panose="02010600030101010101" pitchFamily="2" charset="-122"/>
+              </a:rPr>
+              <a:t>ReadVTK</a:t>
+            </a:r>
+            <a:endParaRPr lang="zh-CN" altLang="en-US" dirty="0">
+              <a:latin typeface="Times New Roman" panose="02020603050405020304" pitchFamily="18" charset="0"/>
+              <a:ea typeface="宋体" panose="02010600030101010101" pitchFamily="2" charset="-122"/>
+            </a:endParaRPr>
+          </a:p>
+        </p:txBody>
+      </p:sp>
+      <p:sp>
+        <p:nvSpPr>
+          <p:cNvPr id="8" name="矩形 7">
+            <a:extLst>
+              <a:ext uri="{FF2B5EF4-FFF2-40B4-BE49-F238E27FC236}">
+                <a16:creationId xmlns:a16="http://schemas.microsoft.com/office/drawing/2014/main" id="{E59781D6-3787-7848-15FE-A3CCEC34590C}"/>
+              </a:ext>
+            </a:extLst>
+          </p:cNvPr>
+          <p:cNvSpPr/>
+          <p:nvPr/>
+        </p:nvSpPr>
+        <p:spPr>
+          <a:xfrm>
+            <a:off x="3606214" y="3404530"/>
+            <a:ext cx="1300065" cy="373224"/>
+          </a:xfrm>
+          <a:prstGeom prst="rect">
+            <a:avLst/>
+          </a:prstGeom>
+        </p:spPr>
+        <p:style>
+          <a:lnRef idx="2">
+            <a:schemeClr val="accent6"/>
+          </a:lnRef>
+          <a:fillRef idx="1">
+            <a:schemeClr val="lt1"/>
+          </a:fillRef>
+          <a:effectRef idx="0">
+            <a:schemeClr val="accent6"/>
+          </a:effectRef>
+          <a:fontRef idx="minor">
+            <a:schemeClr val="dk1"/>
+          </a:fontRef>
+        </p:style>
+        <p:txBody>
+          <a:bodyPr rtlCol="0" anchor="ctr"/>
+          <a:lstStyle/>
+          <a:p>
+            <a:pPr algn="ctr"/>
+            <a:r>
+              <a:rPr lang="en-US" altLang="zh-CN" dirty="0" err="1">
+                <a:latin typeface="Times New Roman" panose="02020603050405020304" pitchFamily="18" charset="0"/>
+                <a:ea typeface="宋体" panose="02010600030101010101" pitchFamily="2" charset="-122"/>
+              </a:rPr>
+              <a:t>WriteHDF</a:t>
+            </a:r>
+            <a:endParaRPr lang="zh-CN" altLang="en-US" dirty="0">
+              <a:latin typeface="Times New Roman" panose="02020603050405020304" pitchFamily="18" charset="0"/>
+              <a:ea typeface="宋体" panose="02010600030101010101" pitchFamily="2" charset="-122"/>
+            </a:endParaRPr>
+          </a:p>
+        </p:txBody>
+      </p:sp>
+      <p:cxnSp>
+        <p:nvCxnSpPr>
+          <p:cNvPr id="22" name="连接符: 肘形 21">
+            <a:extLst>
+              <a:ext uri="{FF2B5EF4-FFF2-40B4-BE49-F238E27FC236}">
+                <a16:creationId xmlns:a16="http://schemas.microsoft.com/office/drawing/2014/main" id="{576E9A0E-921A-E3FF-612F-7ADFE8F05D63}"/>
+              </a:ext>
+            </a:extLst>
+          </p:cNvPr>
+          <p:cNvCxnSpPr>
+            <a:cxnSpLocks/>
+            <a:stCxn id="39" idx="2"/>
+            <a:endCxn id="5" idx="1"/>
+          </p:cNvCxnSpPr>
+          <p:nvPr/>
+        </p:nvCxnSpPr>
+        <p:spPr>
+          <a:xfrm rot="16200000" flipH="1">
+            <a:off x="1790302" y="3287626"/>
+            <a:ext cx="405218" cy="201813"/>
+          </a:xfrm>
+          <a:prstGeom prst="bentConnector2">
+            <a:avLst/>
+          </a:prstGeom>
+          <a:ln>
+            <a:solidFill>
+              <a:schemeClr val="tx1"/>
+            </a:solidFill>
+            <a:tailEnd type="triangle"/>
+          </a:ln>
+        </p:spPr>
+        <p:style>
+          <a:lnRef idx="1">
+            <a:schemeClr val="accent1"/>
+          </a:lnRef>
+          <a:fillRef idx="0">
+            <a:schemeClr val="accent1"/>
+          </a:fillRef>
+          <a:effectRef idx="0">
+            <a:schemeClr val="accent1"/>
+          </a:effectRef>
+          <a:fontRef idx="minor">
+            <a:schemeClr val="tx1"/>
+          </a:fontRef>
+        </p:style>
+      </p:cxnSp>
+      <p:sp>
+        <p:nvSpPr>
+          <p:cNvPr id="39" name="流程图: 多文档 38">
+            <a:extLst>
+              <a:ext uri="{FF2B5EF4-FFF2-40B4-BE49-F238E27FC236}">
+                <a16:creationId xmlns:a16="http://schemas.microsoft.com/office/drawing/2014/main" id="{806FFBD4-AA52-6E76-B7C8-9E54D55CA79C}"/>
+              </a:ext>
+            </a:extLst>
+          </p:cNvPr>
+          <p:cNvSpPr/>
+          <p:nvPr/>
+        </p:nvSpPr>
+        <p:spPr>
+          <a:xfrm>
+            <a:off x="1332375" y="2280397"/>
+            <a:ext cx="1300065" cy="941169"/>
+          </a:xfrm>
+          <a:prstGeom prst="flowChartMultidocument">
+            <a:avLst/>
+          </a:prstGeom>
+        </p:spPr>
+        <p:style>
+          <a:lnRef idx="2">
+            <a:schemeClr val="dk1"/>
+          </a:lnRef>
+          <a:fillRef idx="1">
+            <a:schemeClr val="lt1"/>
+          </a:fillRef>
+          <a:effectRef idx="0">
+            <a:schemeClr val="dk1"/>
+          </a:effectRef>
+          <a:fontRef idx="minor">
+            <a:schemeClr val="dk1"/>
+          </a:fontRef>
+        </p:style>
+        <p:txBody>
+          <a:bodyPr rtlCol="0" anchor="ctr"/>
+          <a:lstStyle/>
+          <a:p>
+            <a:pPr algn="ctr"/>
+            <a:r>
+              <a:rPr lang="en-US" altLang="zh-CN" dirty="0" err="1">
+                <a:latin typeface="Times New Roman" panose="02020603050405020304" pitchFamily="18" charset="0"/>
+                <a:cs typeface="Times New Roman" panose="02020603050405020304" pitchFamily="18" charset="0"/>
+              </a:rPr>
+              <a:t>VTKData</a:t>
+            </a:r>
+            <a:endParaRPr lang="zh-CN" altLang="en-US" dirty="0">
+              <a:latin typeface="Times New Roman" panose="02020603050405020304" pitchFamily="18" charset="0"/>
+              <a:cs typeface="Times New Roman" panose="02020603050405020304" pitchFamily="18" charset="0"/>
+            </a:endParaRPr>
+          </a:p>
+        </p:txBody>
+      </p:sp>
+      <p:sp>
+        <p:nvSpPr>
+          <p:cNvPr id="47" name="流程图: 多文档 46">
+            <a:extLst>
+              <a:ext uri="{FF2B5EF4-FFF2-40B4-BE49-F238E27FC236}">
+                <a16:creationId xmlns:a16="http://schemas.microsoft.com/office/drawing/2014/main" id="{3189329C-FEE4-408C-6C82-D6A8A4C78A01}"/>
+              </a:ext>
+            </a:extLst>
+          </p:cNvPr>
+          <p:cNvSpPr/>
+          <p:nvPr/>
+        </p:nvSpPr>
+        <p:spPr>
+          <a:xfrm>
+            <a:off x="4583072" y="2280396"/>
+            <a:ext cx="1544393" cy="941169"/>
+          </a:xfrm>
+          <a:prstGeom prst="flowChartMultidocument">
+            <a:avLst/>
+          </a:prstGeom>
+        </p:spPr>
+        <p:style>
+          <a:lnRef idx="2">
+            <a:schemeClr val="dk1"/>
+          </a:lnRef>
+          <a:fillRef idx="1">
+            <a:schemeClr val="lt1"/>
+          </a:fillRef>
+          <a:effectRef idx="0">
+            <a:schemeClr val="dk1"/>
+          </a:effectRef>
+          <a:fontRef idx="minor">
+            <a:schemeClr val="dk1"/>
+          </a:fontRef>
+        </p:style>
+        <p:txBody>
+          <a:bodyPr rtlCol="0" anchor="ctr"/>
+          <a:lstStyle/>
+          <a:p>
+            <a:pPr algn="ctr"/>
+            <a:r>
+              <a:rPr lang="en-US" altLang="zh-CN" dirty="0">
+                <a:latin typeface="Times New Roman" panose="02020603050405020304" pitchFamily="18" charset="0"/>
+                <a:cs typeface="Times New Roman" panose="02020603050405020304" pitchFamily="18" charset="0"/>
+              </a:rPr>
+              <a:t>HDF5</a:t>
+            </a:r>
+          </a:p>
+          <a:p>
+            <a:pPr algn="ctr"/>
+            <a:r>
+              <a:rPr lang="en-US" altLang="zh-CN" dirty="0">
+                <a:latin typeface="Times New Roman" panose="02020603050405020304" pitchFamily="18" charset="0"/>
+                <a:cs typeface="Times New Roman" panose="02020603050405020304" pitchFamily="18" charset="0"/>
+              </a:rPr>
+              <a:t>Matrix Data</a:t>
+            </a:r>
+            <a:endParaRPr lang="zh-CN" altLang="en-US" dirty="0">
+              <a:latin typeface="Times New Roman" panose="02020603050405020304" pitchFamily="18" charset="0"/>
+              <a:cs typeface="Times New Roman" panose="02020603050405020304" pitchFamily="18" charset="0"/>
+            </a:endParaRPr>
+          </a:p>
+        </p:txBody>
+      </p:sp>
+      <p:sp>
+        <p:nvSpPr>
+          <p:cNvPr id="48" name="动作按钮: 获取信息 47">
+            <a:hlinkClick r:id="" action="ppaction://noaction" highlightClick="1"/>
+            <a:extLst>
+              <a:ext uri="{FF2B5EF4-FFF2-40B4-BE49-F238E27FC236}">
+                <a16:creationId xmlns:a16="http://schemas.microsoft.com/office/drawing/2014/main" id="{641C3F78-A4C5-F63E-9ED5-2D260DF9BF25}"/>
+              </a:ext>
+            </a:extLst>
+          </p:cNvPr>
+          <p:cNvSpPr/>
+          <p:nvPr/>
+        </p:nvSpPr>
+        <p:spPr>
+          <a:xfrm>
+            <a:off x="2136359" y="3522305"/>
+            <a:ext cx="162137" cy="186612"/>
+          </a:xfrm>
+          <a:prstGeom prst="actionButtonInformation">
+            <a:avLst/>
+          </a:prstGeom>
+          <a:ln>
+            <a:noFill/>
+          </a:ln>
+        </p:spPr>
+        <p:style>
+          <a:lnRef idx="2">
+            <a:schemeClr val="dk1"/>
+          </a:lnRef>
+          <a:fillRef idx="1">
+            <a:schemeClr val="lt1"/>
+          </a:fillRef>
+          <a:effectRef idx="0">
+            <a:schemeClr val="dk1"/>
+          </a:effectRef>
+          <a:fontRef idx="minor">
+            <a:schemeClr val="dk1"/>
+          </a:fontRef>
+        </p:style>
+        <p:txBody>
+          <a:bodyPr rtlCol="0" anchor="ctr"/>
+          <a:lstStyle/>
+          <a:p>
+            <a:pPr algn="ctr"/>
+            <a:endParaRPr lang="zh-CN" altLang="en-US"/>
+          </a:p>
+        </p:txBody>
+      </p:sp>
+      <p:sp>
+        <p:nvSpPr>
+          <p:cNvPr id="49" name="矩形: 圆角 48">
+            <a:extLst>
+              <a:ext uri="{FF2B5EF4-FFF2-40B4-BE49-F238E27FC236}">
+                <a16:creationId xmlns:a16="http://schemas.microsoft.com/office/drawing/2014/main" id="{8A5B7FFC-EB8A-1C3B-CD25-91A3EA188BE6}"/>
+              </a:ext>
+            </a:extLst>
+          </p:cNvPr>
+          <p:cNvSpPr/>
+          <p:nvPr/>
+        </p:nvSpPr>
+        <p:spPr>
+          <a:xfrm>
+            <a:off x="6468480" y="1542615"/>
+            <a:ext cx="1333085" cy="756396"/>
+          </a:xfrm>
+          <a:prstGeom prst="roundRect">
+            <a:avLst>
+              <a:gd name="adj" fmla="val 34297"/>
+            </a:avLst>
+          </a:prstGeom>
+        </p:spPr>
+        <p:style>
+          <a:lnRef idx="2">
+            <a:schemeClr val="dk1"/>
+          </a:lnRef>
+          <a:fillRef idx="1">
+            <a:schemeClr val="lt1"/>
+          </a:fillRef>
+          <a:effectRef idx="0">
+            <a:schemeClr val="dk1"/>
+          </a:effectRef>
+          <a:fontRef idx="minor">
+            <a:schemeClr val="dk1"/>
+          </a:fontRef>
+        </p:style>
+        <p:txBody>
+          <a:bodyPr rtlCol="0" anchor="ctr"/>
+          <a:lstStyle/>
+          <a:p>
+            <a:pPr algn="ctr"/>
+            <a:r>
+              <a:rPr lang="en-US" altLang="zh-CN" dirty="0">
+                <a:latin typeface="Times New Roman" panose="02020603050405020304" pitchFamily="18" charset="0"/>
+                <a:ea typeface="宋体" panose="02010600030101010101" pitchFamily="2" charset="-122"/>
+              </a:rPr>
+              <a:t>FNN</a:t>
+            </a:r>
+            <a:endParaRPr lang="zh-CN" altLang="en-US" dirty="0">
+              <a:latin typeface="Times New Roman" panose="02020603050405020304" pitchFamily="18" charset="0"/>
+              <a:ea typeface="宋体" panose="02010600030101010101" pitchFamily="2" charset="-122"/>
+            </a:endParaRPr>
+          </a:p>
+        </p:txBody>
+      </p:sp>
+      <p:sp>
+        <p:nvSpPr>
+          <p:cNvPr id="50" name="矩形: 圆角 49">
+            <a:extLst>
+              <a:ext uri="{FF2B5EF4-FFF2-40B4-BE49-F238E27FC236}">
+                <a16:creationId xmlns:a16="http://schemas.microsoft.com/office/drawing/2014/main" id="{0095507F-2B96-80A0-9022-B57677E45E46}"/>
+              </a:ext>
+            </a:extLst>
+          </p:cNvPr>
+          <p:cNvSpPr/>
+          <p:nvPr/>
+        </p:nvSpPr>
+        <p:spPr>
+          <a:xfrm>
+            <a:off x="6468479" y="3237414"/>
+            <a:ext cx="1333085" cy="756396"/>
+          </a:xfrm>
+          <a:prstGeom prst="roundRect">
+            <a:avLst>
+              <a:gd name="adj" fmla="val 34297"/>
+            </a:avLst>
+          </a:prstGeom>
+        </p:spPr>
+        <p:style>
+          <a:lnRef idx="2">
+            <a:schemeClr val="dk1"/>
+          </a:lnRef>
+          <a:fillRef idx="1">
+            <a:schemeClr val="lt1"/>
+          </a:fillRef>
+          <a:effectRef idx="0">
+            <a:schemeClr val="dk1"/>
+          </a:effectRef>
+          <a:fontRef idx="minor">
+            <a:schemeClr val="dk1"/>
+          </a:fontRef>
+        </p:style>
+        <p:txBody>
+          <a:bodyPr rtlCol="0" anchor="ctr"/>
+          <a:lstStyle/>
+          <a:p>
+            <a:pPr algn="ctr"/>
+            <a:r>
+              <a:rPr lang="en-US" altLang="zh-CN" dirty="0">
+                <a:latin typeface="Times New Roman" panose="02020603050405020304" pitchFamily="18" charset="0"/>
+                <a:ea typeface="宋体" panose="02010600030101010101" pitchFamily="2" charset="-122"/>
+              </a:rPr>
+              <a:t>GAN</a:t>
+            </a:r>
+            <a:endParaRPr lang="zh-CN" altLang="en-US" dirty="0">
+              <a:latin typeface="Times New Roman" panose="02020603050405020304" pitchFamily="18" charset="0"/>
+              <a:ea typeface="宋体" panose="02010600030101010101" pitchFamily="2" charset="-122"/>
+            </a:endParaRPr>
+          </a:p>
+        </p:txBody>
+      </p:sp>
+      <p:sp>
+        <p:nvSpPr>
+          <p:cNvPr id="7" name="动作按钮: 获取信息 6">
+            <a:hlinkClick r:id="" action="ppaction://noaction" highlightClick="1"/>
+            <a:extLst>
+              <a:ext uri="{FF2B5EF4-FFF2-40B4-BE49-F238E27FC236}">
+                <a16:creationId xmlns:a16="http://schemas.microsoft.com/office/drawing/2014/main" id="{5A971CF0-1278-A8A6-368C-B0161D9501A2}"/>
+              </a:ext>
+            </a:extLst>
+          </p:cNvPr>
+          <p:cNvSpPr/>
+          <p:nvPr/>
+        </p:nvSpPr>
+        <p:spPr>
+          <a:xfrm>
+            <a:off x="3629510" y="3522305"/>
+            <a:ext cx="162137" cy="186612"/>
+          </a:xfrm>
+          <a:prstGeom prst="actionButtonInformation">
+            <a:avLst/>
+          </a:prstGeom>
+          <a:ln>
+            <a:noFill/>
+          </a:ln>
+        </p:spPr>
+        <p:style>
+          <a:lnRef idx="2">
+            <a:schemeClr val="dk1"/>
+          </a:lnRef>
+          <a:fillRef idx="1">
+            <a:schemeClr val="lt1"/>
+          </a:fillRef>
+          <a:effectRef idx="0">
+            <a:schemeClr val="dk1"/>
+          </a:effectRef>
+          <a:fontRef idx="minor">
+            <a:schemeClr val="dk1"/>
+          </a:fontRef>
+        </p:style>
+        <p:txBody>
+          <a:bodyPr rtlCol="0" anchor="ctr"/>
+          <a:lstStyle/>
+          <a:p>
+            <a:pPr algn="ctr"/>
+            <a:endParaRPr lang="zh-CN" altLang="en-US"/>
+          </a:p>
+        </p:txBody>
+      </p:sp>
+      <p:cxnSp>
+        <p:nvCxnSpPr>
+          <p:cNvPr id="10" name="直接箭头连接符 9">
+            <a:extLst>
+              <a:ext uri="{FF2B5EF4-FFF2-40B4-BE49-F238E27FC236}">
+                <a16:creationId xmlns:a16="http://schemas.microsoft.com/office/drawing/2014/main" id="{CB99C312-760F-86BD-428E-7BDF0F2FEC85}"/>
+              </a:ext>
+            </a:extLst>
+          </p:cNvPr>
+          <p:cNvCxnSpPr>
+            <a:stCxn id="5" idx="3"/>
+            <a:endCxn id="8" idx="1"/>
+          </p:cNvCxnSpPr>
+          <p:nvPr/>
+        </p:nvCxnSpPr>
+        <p:spPr>
+          <a:xfrm>
+            <a:off x="3393883" y="3591142"/>
+            <a:ext cx="212331" cy="0"/>
+          </a:xfrm>
+          <a:prstGeom prst="straightConnector1">
+            <a:avLst/>
+          </a:prstGeom>
+          <a:ln>
+            <a:solidFill>
+              <a:schemeClr val="tx1"/>
+            </a:solidFill>
+            <a:tailEnd type="triangle"/>
+          </a:ln>
+        </p:spPr>
+        <p:style>
+          <a:lnRef idx="1">
+            <a:schemeClr val="accent1"/>
+          </a:lnRef>
+          <a:fillRef idx="0">
+            <a:schemeClr val="accent1"/>
+          </a:fillRef>
+          <a:effectRef idx="0">
+            <a:schemeClr val="accent1"/>
+          </a:effectRef>
+          <a:fontRef idx="minor">
+            <a:schemeClr val="tx1"/>
+          </a:fontRef>
+        </p:style>
+      </p:cxnSp>
+      <p:cxnSp>
+        <p:nvCxnSpPr>
+          <p:cNvPr id="12" name="连接符: 肘形 11">
+            <a:extLst>
+              <a:ext uri="{FF2B5EF4-FFF2-40B4-BE49-F238E27FC236}">
+                <a16:creationId xmlns:a16="http://schemas.microsoft.com/office/drawing/2014/main" id="{1BF35839-1746-56FF-EE15-40E72FBBB994}"/>
+              </a:ext>
+            </a:extLst>
+          </p:cNvPr>
+          <p:cNvCxnSpPr>
+            <a:cxnSpLocks/>
+            <a:stCxn id="8" idx="3"/>
+            <a:endCxn id="47" idx="2"/>
+          </p:cNvCxnSpPr>
+          <p:nvPr/>
+        </p:nvCxnSpPr>
+        <p:spPr>
+          <a:xfrm flipV="1">
+            <a:off x="4906279" y="3185923"/>
+            <a:ext cx="341597" cy="405219"/>
+          </a:xfrm>
+          <a:prstGeom prst="bentConnector2">
+            <a:avLst/>
+          </a:prstGeom>
+          <a:ln>
+            <a:solidFill>
+              <a:schemeClr val="tx1"/>
+            </a:solidFill>
+            <a:tailEnd type="triangle"/>
+          </a:ln>
+        </p:spPr>
+        <p:style>
+          <a:lnRef idx="1">
+            <a:schemeClr val="accent1"/>
+          </a:lnRef>
+          <a:fillRef idx="0">
+            <a:schemeClr val="accent1"/>
+          </a:fillRef>
+          <a:effectRef idx="0">
+            <a:schemeClr val="accent1"/>
+          </a:effectRef>
+          <a:fontRef idx="minor">
+            <a:schemeClr val="tx1"/>
+          </a:fontRef>
+        </p:style>
+      </p:cxnSp>
+      <p:sp>
+        <p:nvSpPr>
+          <p:cNvPr id="14" name="流程图: 多文档 13">
+            <a:extLst>
+              <a:ext uri="{FF2B5EF4-FFF2-40B4-BE49-F238E27FC236}">
+                <a16:creationId xmlns:a16="http://schemas.microsoft.com/office/drawing/2014/main" id="{22C4B86D-6553-E319-22AF-14F595878AD8}"/>
+              </a:ext>
+            </a:extLst>
+          </p:cNvPr>
+          <p:cNvSpPr/>
+          <p:nvPr/>
+        </p:nvSpPr>
+        <p:spPr>
+          <a:xfrm>
+            <a:off x="2941991" y="2280397"/>
+            <a:ext cx="1300065" cy="941169"/>
+          </a:xfrm>
+          <a:prstGeom prst="flowChartMultidocument">
+            <a:avLst/>
+          </a:prstGeom>
+          <a:ln>
+            <a:prstDash val="dash"/>
+          </a:ln>
+        </p:spPr>
+        <p:style>
+          <a:lnRef idx="2">
+            <a:schemeClr val="dk1"/>
+          </a:lnRef>
+          <a:fillRef idx="1">
+            <a:schemeClr val="lt1"/>
+          </a:fillRef>
+          <a:effectRef idx="0">
+            <a:schemeClr val="dk1"/>
+          </a:effectRef>
+          <a:fontRef idx="minor">
+            <a:schemeClr val="dk1"/>
+          </a:fontRef>
+        </p:style>
+        <p:txBody>
+          <a:bodyPr rtlCol="0" anchor="ctr"/>
+          <a:lstStyle/>
+          <a:p>
+            <a:pPr algn="ctr"/>
+            <a:r>
+              <a:rPr lang="en-US" altLang="zh-CN" dirty="0" err="1">
+                <a:latin typeface="Times New Roman" panose="02020603050405020304" pitchFamily="18" charset="0"/>
+                <a:cs typeface="Times New Roman" panose="02020603050405020304" pitchFamily="18" charset="0"/>
+              </a:rPr>
+              <a:t>CSVData</a:t>
+            </a:r>
+            <a:endParaRPr lang="zh-CN" altLang="en-US" dirty="0">
+              <a:latin typeface="Times New Roman" panose="02020603050405020304" pitchFamily="18" charset="0"/>
+              <a:cs typeface="Times New Roman" panose="02020603050405020304" pitchFamily="18" charset="0"/>
+            </a:endParaRPr>
+          </a:p>
+        </p:txBody>
+      </p:sp>
+      <p:sp>
+        <p:nvSpPr>
+          <p:cNvPr id="20" name="箭头: 圆角右 19">
+            <a:extLst>
+              <a:ext uri="{FF2B5EF4-FFF2-40B4-BE49-F238E27FC236}">
+                <a16:creationId xmlns:a16="http://schemas.microsoft.com/office/drawing/2014/main" id="{F57A55BF-DDE4-984F-52CA-355F8169E6A9}"/>
+              </a:ext>
+            </a:extLst>
+          </p:cNvPr>
+          <p:cNvSpPr/>
+          <p:nvPr/>
+        </p:nvSpPr>
+        <p:spPr>
+          <a:xfrm>
+            <a:off x="5705475" y="1704975"/>
+            <a:ext cx="628650" cy="466725"/>
+          </a:xfrm>
+          <a:prstGeom prst="bentArrow">
+            <a:avLst/>
+          </a:prstGeom>
+          <a:noFill/>
+        </p:spPr>
+        <p:style>
+          <a:lnRef idx="2">
+            <a:schemeClr val="accent1">
+              <a:shade val="15000"/>
+            </a:schemeClr>
+          </a:lnRef>
+          <a:fillRef idx="1">
+            <a:schemeClr val="accent1"/>
+          </a:fillRef>
+          <a:effectRef idx="0">
+            <a:schemeClr val="accent1"/>
+          </a:effectRef>
+          <a:fontRef idx="minor">
+            <a:schemeClr val="lt1"/>
+          </a:fontRef>
+        </p:style>
+        <p:txBody>
+          <a:bodyPr rtlCol="0" anchor="ctr"/>
+          <a:lstStyle/>
+          <a:p>
+            <a:pPr algn="ctr"/>
+            <a:endParaRPr lang="zh-CN" altLang="en-US">
+              <a:solidFill>
+                <a:schemeClr val="tx1"/>
+              </a:solidFill>
+            </a:endParaRPr>
+          </a:p>
+        </p:txBody>
+      </p:sp>
+      <p:sp>
+        <p:nvSpPr>
+          <p:cNvPr id="21" name="箭头: 圆角右 20">
+            <a:extLst>
+              <a:ext uri="{FF2B5EF4-FFF2-40B4-BE49-F238E27FC236}">
+                <a16:creationId xmlns:a16="http://schemas.microsoft.com/office/drawing/2014/main" id="{31B4FAE6-93D5-191A-C3D3-F1B3BFF3695A}"/>
+              </a:ext>
+            </a:extLst>
+          </p:cNvPr>
+          <p:cNvSpPr/>
+          <p:nvPr/>
+        </p:nvSpPr>
+        <p:spPr>
+          <a:xfrm flipV="1">
+            <a:off x="5751161" y="3288942"/>
+            <a:ext cx="628650" cy="466725"/>
+          </a:xfrm>
+          <a:prstGeom prst="bentArrow">
+            <a:avLst/>
+          </a:prstGeom>
+          <a:noFill/>
+        </p:spPr>
+        <p:style>
+          <a:lnRef idx="2">
+            <a:schemeClr val="accent1">
+              <a:shade val="15000"/>
+            </a:schemeClr>
+          </a:lnRef>
+          <a:fillRef idx="1">
+            <a:schemeClr val="accent1"/>
+          </a:fillRef>
+          <a:effectRef idx="0">
+            <a:schemeClr val="accent1"/>
+          </a:effectRef>
+          <a:fontRef idx="minor">
+            <a:schemeClr val="lt1"/>
+          </a:fontRef>
+        </p:style>
+        <p:txBody>
+          <a:bodyPr rtlCol="0" anchor="ctr"/>
+          <a:lstStyle/>
+          <a:p>
+            <a:pPr algn="ctr"/>
+            <a:endParaRPr lang="zh-CN" altLang="en-US">
+              <a:solidFill>
+                <a:schemeClr val="tx1"/>
+              </a:solidFill>
+            </a:endParaRPr>
+          </a:p>
+        </p:txBody>
+      </p:sp>
+      <p:cxnSp>
+        <p:nvCxnSpPr>
+          <p:cNvPr id="24" name="直接箭头连接符 23">
+            <a:extLst>
+              <a:ext uri="{FF2B5EF4-FFF2-40B4-BE49-F238E27FC236}">
+                <a16:creationId xmlns:a16="http://schemas.microsoft.com/office/drawing/2014/main" id="{6577A57B-5B4D-0DD4-4CB7-CEBA14616CCC}"/>
+              </a:ext>
+            </a:extLst>
+          </p:cNvPr>
+          <p:cNvCxnSpPr>
+            <a:cxnSpLocks/>
+          </p:cNvCxnSpPr>
+          <p:nvPr/>
+        </p:nvCxnSpPr>
+        <p:spPr>
+          <a:xfrm flipH="1" flipV="1">
+            <a:off x="6248400" y="2933700"/>
+            <a:ext cx="543288" cy="252223"/>
+          </a:xfrm>
+          <a:prstGeom prst="straightConnector1">
+            <a:avLst/>
+          </a:prstGeom>
+          <a:ln w="12700">
+            <a:solidFill>
+              <a:schemeClr val="tx1"/>
+            </a:solidFill>
+            <a:prstDash val="dash"/>
+            <a:tailEnd type="triangle"/>
+          </a:ln>
+        </p:spPr>
+        <p:style>
+          <a:lnRef idx="1">
+            <a:schemeClr val="accent1"/>
+          </a:lnRef>
+          <a:fillRef idx="0">
+            <a:schemeClr val="accent1"/>
+          </a:fillRef>
+          <a:effectRef idx="0">
+            <a:schemeClr val="accent1"/>
+          </a:effectRef>
+          <a:fontRef idx="minor">
+            <a:schemeClr val="tx1"/>
+          </a:fontRef>
+        </p:style>
+      </p:cxnSp>
+      <p:cxnSp>
+        <p:nvCxnSpPr>
+          <p:cNvPr id="26" name="直接箭头连接符 25">
+            <a:extLst>
+              <a:ext uri="{FF2B5EF4-FFF2-40B4-BE49-F238E27FC236}">
+                <a16:creationId xmlns:a16="http://schemas.microsoft.com/office/drawing/2014/main" id="{838E5046-4C15-F3CE-05F5-032A1F3261EF}"/>
+              </a:ext>
+            </a:extLst>
+          </p:cNvPr>
+          <p:cNvCxnSpPr>
+            <a:cxnSpLocks/>
+          </p:cNvCxnSpPr>
+          <p:nvPr/>
+        </p:nvCxnSpPr>
+        <p:spPr>
+          <a:xfrm flipH="1">
+            <a:off x="6248400" y="2366388"/>
+            <a:ext cx="447675" cy="384592"/>
+          </a:xfrm>
+          <a:prstGeom prst="straightConnector1">
+            <a:avLst/>
+          </a:prstGeom>
+          <a:ln w="12700">
+            <a:solidFill>
+              <a:schemeClr val="tx1"/>
+            </a:solidFill>
+            <a:prstDash val="dash"/>
+            <a:tailEnd type="triangle"/>
+          </a:ln>
+        </p:spPr>
+        <p:style>
+          <a:lnRef idx="1">
+            <a:schemeClr val="accent1"/>
+          </a:lnRef>
+          <a:fillRef idx="0">
+            <a:schemeClr val="accent1"/>
+          </a:fillRef>
+          <a:effectRef idx="0">
+            <a:schemeClr val="accent1"/>
+          </a:effectRef>
+          <a:fontRef idx="minor">
+            <a:schemeClr val="tx1"/>
+          </a:fontRef>
+        </p:style>
+      </p:cxnSp>
+    </p:spTree>
+    <p:extLst>
+      <p:ext uri="{BB962C8B-B14F-4D97-AF65-F5344CB8AC3E}">
+        <p14:creationId xmlns:p14="http://schemas.microsoft.com/office/powerpoint/2010/main" val="678795726"/>
+      </p:ext>
+    </p:extLst>
+  </p:cSld>
+  <p:clrMapOvr>
+    <a:masterClrMapping/>
+  </p:clrMapOvr>
+</p:sld>
+</file>
+
 <file path=ppt/theme/theme1.xml><?xml version="1.0" encoding="utf-8"?>
 <a:theme xmlns:a="http://schemas.openxmlformats.org/drawingml/2006/main" name="Office 主题​​">
   <a:themeElements>

</xml_diff>